<commit_message>
Add resources for Topic 1 - Intro to IT
</commit_message>
<xml_diff>
--- a/Courses/Computer-Modeling-and-IT/Computer-Modeling-and-IT-5-Class/01-Intro-to-IT/01-Intro-to-IT.pptx
+++ b/Courses/Computer-Modeling-and-IT/Computer-Modeling-and-IT-5-Class/01-Intro-to-IT/01-Intro-to-IT.pptx
@@ -297,7 +297,7 @@
           <a:p>
             <a:fld id="{4E087215-0C8F-4762-A664-737A353EC9A4}" type="datetimeFigureOut">
               <a:rPr lang="bg-BG" smtClean="0"/>
-              <a:t>23.06.23 г.</a:t>
+              <a:t>26.6.2023 г.</a:t>
             </a:fld>
             <a:endParaRPr lang="bg-BG"/>
           </a:p>
@@ -474,7 +474,7 @@
           <a:p>
             <a:fld id="{72D84649-876A-46C9-8472-14CB09C070D8}" type="datetimeFigureOut">
               <a:rPr lang="en-US" smtClean="0"/>
-              <a:t>6/23/23</a:t>
+              <a:t>6/26/2023</a:t>
             </a:fld>
             <a:endParaRPr lang="en-US"/>
           </a:p>
@@ -3071,7 +3071,7 @@
             <a:fld id="{055373AC-9AA7-423B-BA00-BA1C74164DBD}" type="datetime1">
               <a:rPr lang="en-US" smtClean="0"/>
               <a:pPr/>
-              <a:t>6/23/23</a:t>
+              <a:t>6/26/2023</a:t>
             </a:fld>
             <a:endParaRPr lang="en-US" dirty="0"/>
           </a:p>
@@ -3750,7 +3750,7 @@
             <a:fld id="{055373AC-9AA7-423B-BA00-BA1C74164DBD}" type="datetime1">
               <a:rPr lang="en-US" smtClean="0"/>
               <a:pPr/>
-              <a:t>6/23/23</a:t>
+              <a:t>6/26/2023</a:t>
             </a:fld>
             <a:endParaRPr lang="en-US" dirty="0"/>
           </a:p>
@@ -4245,7 +4245,7 @@
             <a:fld id="{055373AC-9AA7-423B-BA00-BA1C74164DBD}" type="datetime1">
               <a:rPr lang="en-US" smtClean="0"/>
               <a:pPr/>
-              <a:t>6/23/23</a:t>
+              <a:t>6/26/2023</a:t>
             </a:fld>
             <a:endParaRPr lang="en-US" dirty="0"/>
           </a:p>
@@ -6355,7 +6355,7 @@
             <a:fld id="{055373AC-9AA7-423B-BA00-BA1C74164DBD}" type="datetime1">
               <a:rPr lang="en-US" smtClean="0"/>
               <a:pPr/>
-              <a:t>6/23/23</a:t>
+              <a:t>6/26/2023</a:t>
             </a:fld>
             <a:endParaRPr lang="en-US" dirty="0"/>
           </a:p>
@@ -7694,7 +7694,7 @@
             <a:fld id="{055373AC-9AA7-423B-BA00-BA1C74164DBD}" type="datetime1">
               <a:rPr lang="en-US" smtClean="0"/>
               <a:pPr/>
-              <a:t>6/23/23</a:t>
+              <a:t>6/26/2023</a:t>
             </a:fld>
             <a:endParaRPr lang="en-US" dirty="0"/>
           </a:p>
@@ -8774,7 +8774,7 @@
             <a:fld id="{055373AC-9AA7-423B-BA00-BA1C74164DBD}" type="datetime1">
               <a:rPr lang="en-US" smtClean="0"/>
               <a:pPr/>
-              <a:t>6/23/23</a:t>
+              <a:t>6/26/2023</a:t>
             </a:fld>
             <a:endParaRPr lang="en-US" dirty="0"/>
           </a:p>
@@ -9186,7 +9186,7 @@
             <a:fld id="{055373AC-9AA7-423B-BA00-BA1C74164DBD}" type="datetime1">
               <a:rPr lang="en-US" smtClean="0"/>
               <a:pPr/>
-              <a:t>6/23/23</a:t>
+              <a:t>6/26/2023</a:t>
             </a:fld>
             <a:endParaRPr lang="en-US" dirty="0"/>
           </a:p>
@@ -9556,7 +9556,7 @@
             <a:fld id="{055373AC-9AA7-423B-BA00-BA1C74164DBD}" type="datetime1">
               <a:rPr lang="en-US" smtClean="0"/>
               <a:pPr/>
-              <a:t>6/23/23</a:t>
+              <a:t>6/26/2023</a:t>
             </a:fld>
             <a:endParaRPr lang="en-US" dirty="0"/>
           </a:p>
@@ -10224,7 +10224,7 @@
             <a:fld id="{055373AC-9AA7-423B-BA00-BA1C74164DBD}" type="datetime1">
               <a:rPr lang="en-US" smtClean="0"/>
               <a:pPr/>
-              <a:t>6/23/23</a:t>
+              <a:t>6/26/2023</a:t>
             </a:fld>
             <a:endParaRPr lang="en-US" dirty="0"/>
           </a:p>
@@ -10432,7 +10432,7 @@
             <a:fld id="{055373AC-9AA7-423B-BA00-BA1C74164DBD}" type="datetime1">
               <a:rPr lang="en-US" smtClean="0"/>
               <a:pPr/>
-              <a:t>6/23/23</a:t>
+              <a:t>6/26/2023</a:t>
             </a:fld>
             <a:endParaRPr lang="en-US" dirty="0"/>
           </a:p>
@@ -11006,26 +11006,23 @@
         </p:spPr>
         <p:txBody>
           <a:bodyPr>
-            <a:normAutofit fontScale="85000" lnSpcReduction="20000"/>
+            <a:normAutofit/>
           </a:bodyPr>
           <a:lstStyle/>
           <a:p>
             <a:r>
-              <a:rPr lang="bg-BG" dirty="0">
-                <a:highlight>
-                  <a:srgbClr val="FFFF00"/>
-                </a:highlight>
-              </a:rPr>
-              <a:t>Въведение в информационните технологии и компютърните системи</a:t>
-            </a:r>
-            <a:endParaRPr lang="en-US" dirty="0">
-              <a:solidFill>
-                <a:srgbClr val="234465"/>
-              </a:solidFill>
-              <a:highlight>
-                <a:srgbClr val="FFFF00"/>
-              </a:highlight>
-            </a:endParaRPr>
+              <a:rPr lang="bg-BG" dirty="0" smtClean="0"/>
+              <a:t>Хардуер</a:t>
+            </a:r>
+            <a:r>
+              <a:rPr lang="bg-BG" dirty="0"/>
+              <a:t> </a:t>
+            </a:r>
+            <a:r>
+              <a:rPr lang="bg-BG" dirty="0" smtClean="0"/>
+              <a:t>и софтуер. Правила за безопасност</a:t>
+            </a:r>
+            <a:endParaRPr lang="en-US" dirty="0"/>
           </a:p>
         </p:txBody>
       </p:sp>
@@ -11214,6 +11211,13 @@
       <p:transition spd="slow" advClick="0" advTm="5000"/>
     </mc:Fallback>
   </mc:AlternateContent>
+  <p:timing>
+    <p:tnLst>
+      <p:par>
+        <p:cTn id="1" dur="indefinite" restart="never" nodeType="tmRoot"/>
+      </p:par>
+    </p:tnLst>
+  </p:timing>
 </p:sld>
 </file>
 
@@ -13636,6 +13640,13 @@
       <p:transition spd="slow" advClick="0" advTm="5000"/>
     </mc:Fallback>
   </mc:AlternateContent>
+  <p:timing>
+    <p:tnLst>
+      <p:par>
+        <p:cTn id="1" dur="indefinite" restart="never" nodeType="tmRoot"/>
+      </p:par>
+    </p:tnLst>
+  </p:timing>
 </p:sld>
 </file>
 
@@ -15357,6 +15368,13 @@
       <p:transition spd="slow" advClick="0" advTm="5000"/>
     </mc:Fallback>
   </mc:AlternateContent>
+  <p:timing>
+    <p:tnLst>
+      <p:par>
+        <p:cTn id="1" dur="indefinite" restart="never" nodeType="tmRoot"/>
+      </p:par>
+    </p:tnLst>
+  </p:timing>
 </p:sld>
 </file>
 
@@ -15555,6 +15573,13 @@
       <p:transition spd="slow" advClick="0" advTm="5000"/>
     </mc:Fallback>
   </mc:AlternateContent>
+  <p:timing>
+    <p:tnLst>
+      <p:par>
+        <p:cTn id="1" dur="indefinite" restart="never" nodeType="tmRoot"/>
+      </p:par>
+    </p:tnLst>
+  </p:timing>
 </p:sld>
 </file>
 
@@ -16193,6 +16218,13 @@
       <p:transition spd="slow" advClick="0" advTm="5000"/>
     </mc:Fallback>
   </mc:AlternateContent>
+  <p:timing>
+    <p:tnLst>
+      <p:par>
+        <p:cTn id="1" dur="indefinite" restart="never" nodeType="tmRoot"/>
+      </p:par>
+    </p:tnLst>
+  </p:timing>
 </p:sld>
 </file>
 
@@ -17130,6 +17162,13 @@
       <p:transition spd="slow" advClick="0" advTm="5000"/>
     </mc:Fallback>
   </mc:AlternateContent>
+  <p:timing>
+    <p:tnLst>
+      <p:par>
+        <p:cTn id="1" dur="indefinite" restart="never" nodeType="tmRoot"/>
+      </p:par>
+    </p:tnLst>
+  </p:timing>
 </p:sld>
 </file>
 
@@ -17364,82 +17403,30 @@
           </a:p>
         </p:txBody>
       </p:sp>
-      <p:sp>
-        <p:nvSpPr>
-          <p:cNvPr id="2" name="Rectangle 1">
-            <a:extLst>
-              <a:ext uri="{FF2B5EF4-FFF2-40B4-BE49-F238E27FC236}">
-                <a16:creationId xmlns:a16="http://schemas.microsoft.com/office/drawing/2014/main" id="{234C2441-1D90-682E-75D8-7C25D12B8B5A}"/>
-              </a:ext>
-            </a:extLst>
-          </p:cNvPr>
-          <p:cNvSpPr/>
+      <p:pic>
+        <p:nvPicPr>
+          <p:cNvPr id="7" name="Картина 6"/>
+          <p:cNvPicPr>
+            <a:picLocks noChangeAspect="1"/>
+          </p:cNvPicPr>
           <p:nvPr/>
-        </p:nvSpPr>
-        <p:spPr bwMode="auto">
+        </p:nvPicPr>
+        <p:blipFill>
+          <a:blip r:embed="rId3"/>
+          <a:stretch>
+            <a:fillRect/>
+          </a:stretch>
+        </p:blipFill>
+        <p:spPr>
           <a:xfrm>
-            <a:off x="5440680" y="4059936"/>
-            <a:ext cx="5001768" cy="2337260"/>
+            <a:off x="5496704" y="3928128"/>
+            <a:ext cx="4586843" cy="2290675"/>
           </a:xfrm>
           <a:prstGeom prst="rect">
             <a:avLst/>
           </a:prstGeom>
-          <a:solidFill>
-            <a:srgbClr val="FFFF00">
-              <a:alpha val="80000"/>
-            </a:srgbClr>
-          </a:solidFill>
-          <a:ln w="19050">
-            <a:solidFill>
-              <a:schemeClr val="tx1">
-                <a:lumMod val="75000"/>
-                <a:alpha val="80000"/>
-              </a:schemeClr>
-            </a:solidFill>
-          </a:ln>
-          <a:effectLst/>
         </p:spPr>
-        <p:style>
-          <a:lnRef idx="2">
-            <a:schemeClr val="accent1">
-              <a:shade val="50000"/>
-            </a:schemeClr>
-          </a:lnRef>
-          <a:fillRef idx="1001">
-            <a:schemeClr val="dk2"/>
-          </a:fillRef>
-          <a:effectRef idx="0">
-            <a:schemeClr val="accent1"/>
-          </a:effectRef>
-          <a:fontRef idx="minor">
-            <a:schemeClr val="lt1"/>
-          </a:fontRef>
-        </p:style>
-        <p:txBody>
-          <a:bodyPr rot="0" spcFirstLastPara="0" vertOverflow="overflow" horzOverflow="overflow" vert="horz" wrap="square" lIns="91440" tIns="45720" rIns="91440" bIns="45720" numCol="1" spcCol="0" rtlCol="0" fromWordArt="0" anchor="ctr" anchorCtr="0" forceAA="0" compatLnSpc="1">
-            <a:prstTxWarp prst="textNoShape">
-              <a:avLst/>
-            </a:prstTxWarp>
-            <a:noAutofit/>
-          </a:bodyPr>
-          <a:lstStyle/>
-          <a:p>
-            <a:pPr algn="ctr"/>
-            <a:endParaRPr lang="en-BG" sz="2800" b="1" dirty="0">
-              <a:solidFill>
-                <a:srgbClr val="FFFFFF"/>
-              </a:solidFill>
-              <a:effectLst>
-                <a:outerShdw blurRad="38100" dist="38100" dir="2700000" algn="tl">
-                  <a:srgbClr val="000000">
-                    <a:alpha val="43137"/>
-                  </a:srgbClr>
-                </a:outerShdw>
-              </a:effectLst>
-            </a:endParaRPr>
-          </a:p>
-        </p:txBody>
-      </p:sp>
+      </p:pic>
     </p:spTree>
     <p:extLst>
       <p:ext uri="{BB962C8B-B14F-4D97-AF65-F5344CB8AC3E}">
@@ -17546,6 +17533,51 @@
                                               <p:pRg st="2" end="2"/>
                                             </p:txEl>
                                           </p:spTgt>
+                                        </p:tgtEl>
+                                        <p:attrNameLst>
+                                          <p:attrName>style.visibility</p:attrName>
+                                        </p:attrNameLst>
+                                      </p:cBhvr>
+                                      <p:to>
+                                        <p:strVal val="visible"/>
+                                      </p:to>
+                                    </p:set>
+                                  </p:childTnLst>
+                                </p:cTn>
+                              </p:par>
+                            </p:childTnLst>
+                          </p:cTn>
+                        </p:par>
+                      </p:childTnLst>
+                    </p:cTn>
+                  </p:par>
+                  <p:par>
+                    <p:cTn id="11" fill="hold">
+                      <p:stCondLst>
+                        <p:cond delay="indefinite"/>
+                      </p:stCondLst>
+                      <p:childTnLst>
+                        <p:par>
+                          <p:cTn id="12" fill="hold">
+                            <p:stCondLst>
+                              <p:cond delay="0"/>
+                            </p:stCondLst>
+                            <p:childTnLst>
+                              <p:par>
+                                <p:cTn id="13" presetID="1" presetClass="entr" presetSubtype="0" fill="hold" nodeType="clickEffect">
+                                  <p:stCondLst>
+                                    <p:cond delay="0"/>
+                                  </p:stCondLst>
+                                  <p:childTnLst>
+                                    <p:set>
+                                      <p:cBhvr>
+                                        <p:cTn id="14" dur="1" fill="hold">
+                                          <p:stCondLst>
+                                            <p:cond delay="0"/>
+                                          </p:stCondLst>
+                                        </p:cTn>
+                                        <p:tgtEl>
+                                          <p:spTgt spid="7"/>
                                         </p:tgtEl>
                                         <p:attrNameLst>
                                           <p:attrName>style.visibility</p:attrName>

</xml_diff>